<commit_message>
feat: Add webpack and Babel sections
</commit_message>
<xml_diff>
--- a/front-end-stack.pptx
+++ b/front-end-stack.pptx
@@ -11,6 +11,10 @@
     <p:sldId id="259" r:id="rId5"/>
     <p:sldId id="260" r:id="rId6"/>
     <p:sldId id="261" r:id="rId7"/>
+    <p:sldId id="262" r:id="rId8"/>
+    <p:sldId id="264" r:id="rId9"/>
+    <p:sldId id="265" r:id="rId10"/>
+    <p:sldId id="266" r:id="rId11"/>
   </p:sldIdLst>
   <p:sldSz cx="12192000" cy="6858000"/>
   <p:notesSz cx="6858000" cy="9144000"/>
@@ -109,6 +113,38 @@
       </a:defRPr>
     </a:lvl9pPr>
   </p:defaultTextStyle>
+  <p:extLst>
+    <p:ext uri="{521415D9-36F7-43E2-AB2F-B90AF26B5E84}">
+      <p14:sectionLst xmlns:p14="http://schemas.microsoft.com/office/powerpoint/2010/main">
+        <p14:section name="Introduction" id="{E19F52F8-1860-B34A-A879-1B7397D0F0AE}">
+          <p14:sldIdLst>
+            <p14:sldId id="256"/>
+          </p14:sldIdLst>
+        </p14:section>
+        <p14:section name="History" id="{5C523697-C78A-8244-B498-F6E0208E8D56}">
+          <p14:sldIdLst>
+            <p14:sldId id="257"/>
+            <p14:sldId id="258"/>
+            <p14:sldId id="259"/>
+            <p14:sldId id="260"/>
+            <p14:sldId id="261"/>
+          </p14:sldIdLst>
+        </p14:section>
+        <p14:section name="webpack" id="{647A4908-2368-E046-98C5-41165951121F}">
+          <p14:sldIdLst>
+            <p14:sldId id="262"/>
+            <p14:sldId id="264"/>
+          </p14:sldIdLst>
+        </p14:section>
+        <p14:section name="Babel" id="{2B476E68-666A-FA4F-997A-6137D690CBE5}">
+          <p14:sldIdLst>
+            <p14:sldId id="265"/>
+            <p14:sldId id="266"/>
+          </p14:sldIdLst>
+        </p14:section>
+      </p14:sectionLst>
+    </p:ext>
+  </p:extLst>
 </p:presentation>
 </file>
 
@@ -18269,6 +18305,65 @@
 </p:sld>
 </file>
 
+<file path=ppt/slides/slide10.xml><?xml version="1.0" encoding="utf-8"?>
+<p:sld xmlns:a="http://schemas.openxmlformats.org/drawingml/2006/main" xmlns:r="http://schemas.openxmlformats.org/officeDocument/2006/relationships" xmlns:p="http://schemas.openxmlformats.org/presentationml/2006/main">
+  <p:cSld>
+    <p:spTree>
+      <p:nvGrpSpPr>
+        <p:cNvPr id="1" name=""/>
+        <p:cNvGrpSpPr/>
+        <p:nvPr/>
+      </p:nvGrpSpPr>
+      <p:grpSpPr>
+        <a:xfrm>
+          <a:off x="0" y="0"/>
+          <a:ext cx="0" cy="0"/>
+          <a:chOff x="0" y="0"/>
+          <a:chExt cx="0" cy="0"/>
+        </a:xfrm>
+      </p:grpSpPr>
+      <p:pic>
+        <p:nvPicPr>
+          <p:cNvPr id="7" name="Picture 6">
+            <a:extLst>
+              <a:ext uri="{FF2B5EF4-FFF2-40B4-BE49-F238E27FC236}">
+                <a16:creationId xmlns:a16="http://schemas.microsoft.com/office/drawing/2014/main" id="{0BF7D9C8-DC77-CA4A-8987-34E4C67AEDDA}"/>
+              </a:ext>
+            </a:extLst>
+          </p:cNvPr>
+          <p:cNvPicPr>
+            <a:picLocks noChangeAspect="1"/>
+          </p:cNvPicPr>
+          <p:nvPr/>
+        </p:nvPicPr>
+        <p:blipFill rotWithShape="1">
+          <a:blip r:embed="rId2"/>
+          <a:srcRect b="11351"/>
+          <a:stretch/>
+        </p:blipFill>
+        <p:spPr>
+          <a:xfrm>
+            <a:off x="1" y="-1"/>
+            <a:ext cx="12192000" cy="6858001"/>
+          </a:xfrm>
+          <a:prstGeom prst="rect">
+            <a:avLst/>
+          </a:prstGeom>
+        </p:spPr>
+      </p:pic>
+    </p:spTree>
+    <p:extLst>
+      <p:ext uri="{BB962C8B-B14F-4D97-AF65-F5344CB8AC3E}">
+        <p14:creationId xmlns:p14="http://schemas.microsoft.com/office/powerpoint/2010/main" val="2465736979"/>
+      </p:ext>
+    </p:extLst>
+  </p:cSld>
+  <p:clrMapOvr>
+    <a:masterClrMapping/>
+  </p:clrMapOvr>
+</p:sld>
+</file>
+
 <file path=ppt/slides/slide2.xml><?xml version="1.0" encoding="utf-8"?>
 <p:sld xmlns:a="http://schemas.openxmlformats.org/drawingml/2006/main" xmlns:r="http://schemas.openxmlformats.org/officeDocument/2006/relationships" xmlns:p="http://schemas.openxmlformats.org/presentationml/2006/main">
   <p:cSld>
@@ -18711,6 +18806,239 @@
 </p:sld>
 </file>
 
+<file path=ppt/slides/slide7.xml><?xml version="1.0" encoding="utf-8"?>
+<p:sld xmlns:a="http://schemas.openxmlformats.org/drawingml/2006/main" xmlns:r="http://schemas.openxmlformats.org/officeDocument/2006/relationships" xmlns:p="http://schemas.openxmlformats.org/presentationml/2006/main">
+  <p:cSld>
+    <p:spTree>
+      <p:nvGrpSpPr>
+        <p:cNvPr id="1" name=""/>
+        <p:cNvGrpSpPr/>
+        <p:nvPr/>
+      </p:nvGrpSpPr>
+      <p:grpSpPr>
+        <a:xfrm>
+          <a:off x="0" y="0"/>
+          <a:ext cx="0" cy="0"/>
+          <a:chOff x="0" y="0"/>
+          <a:chExt cx="0" cy="0"/>
+        </a:xfrm>
+      </p:grpSpPr>
+      <p:sp>
+        <p:nvSpPr>
+          <p:cNvPr id="2" name="Title 1">
+            <a:extLst>
+              <a:ext uri="{FF2B5EF4-FFF2-40B4-BE49-F238E27FC236}">
+                <a16:creationId xmlns:a16="http://schemas.microsoft.com/office/drawing/2014/main" id="{1846E15F-0B2A-C34B-8142-D92C36444344}"/>
+              </a:ext>
+            </a:extLst>
+          </p:cNvPr>
+          <p:cNvSpPr>
+            <a:spLocks noGrp="1"/>
+          </p:cNvSpPr>
+          <p:nvPr>
+            <p:ph type="title"/>
+          </p:nvPr>
+        </p:nvSpPr>
+        <p:spPr/>
+        <p:txBody>
+          <a:bodyPr/>
+          <a:lstStyle/>
+          <a:p>
+            <a:r>
+              <a:rPr lang="en-US" dirty="0"/>
+              <a:t>webpack</a:t>
+            </a:r>
+          </a:p>
+        </p:txBody>
+      </p:sp>
+      <p:sp>
+        <p:nvSpPr>
+          <p:cNvPr id="3" name="Text Placeholder 2">
+            <a:extLst>
+              <a:ext uri="{FF2B5EF4-FFF2-40B4-BE49-F238E27FC236}">
+                <a16:creationId xmlns:a16="http://schemas.microsoft.com/office/drawing/2014/main" id="{06B76489-4D04-D941-84FB-FCE843949B7B}"/>
+              </a:ext>
+            </a:extLst>
+          </p:cNvPr>
+          <p:cNvSpPr>
+            <a:spLocks noGrp="1"/>
+          </p:cNvSpPr>
+          <p:nvPr>
+            <p:ph type="body" idx="1"/>
+          </p:nvPr>
+        </p:nvSpPr>
+        <p:spPr/>
+        <p:txBody>
+          <a:bodyPr/>
+          <a:lstStyle/>
+          <a:p>
+            <a:r>
+              <a:rPr lang="en-US" dirty="0"/>
+              <a:t>Putting stuff together (aka module bundler)</a:t>
+            </a:r>
+          </a:p>
+        </p:txBody>
+      </p:sp>
+    </p:spTree>
+    <p:extLst>
+      <p:ext uri="{BB962C8B-B14F-4D97-AF65-F5344CB8AC3E}">
+        <p14:creationId xmlns:p14="http://schemas.microsoft.com/office/powerpoint/2010/main" val="4079633228"/>
+      </p:ext>
+    </p:extLst>
+  </p:cSld>
+  <p:clrMapOvr>
+    <a:masterClrMapping/>
+  </p:clrMapOvr>
+</p:sld>
+</file>
+
+<file path=ppt/slides/slide8.xml><?xml version="1.0" encoding="utf-8"?>
+<p:sld xmlns:a="http://schemas.openxmlformats.org/drawingml/2006/main" xmlns:r="http://schemas.openxmlformats.org/officeDocument/2006/relationships" xmlns:p="http://schemas.openxmlformats.org/presentationml/2006/main">
+  <p:cSld>
+    <p:spTree>
+      <p:nvGrpSpPr>
+        <p:cNvPr id="1" name=""/>
+        <p:cNvGrpSpPr/>
+        <p:nvPr/>
+      </p:nvGrpSpPr>
+      <p:grpSpPr>
+        <a:xfrm>
+          <a:off x="0" y="0"/>
+          <a:ext cx="0" cy="0"/>
+          <a:chOff x="0" y="0"/>
+          <a:chExt cx="0" cy="0"/>
+        </a:xfrm>
+      </p:grpSpPr>
+      <p:pic>
+        <p:nvPicPr>
+          <p:cNvPr id="5" name="Picture 4">
+            <a:extLst>
+              <a:ext uri="{FF2B5EF4-FFF2-40B4-BE49-F238E27FC236}">
+                <a16:creationId xmlns:a16="http://schemas.microsoft.com/office/drawing/2014/main" id="{670CC8F6-2FC0-D740-B163-E1DA30BA74D8}"/>
+              </a:ext>
+            </a:extLst>
+          </p:cNvPr>
+          <p:cNvPicPr>
+            <a:picLocks noChangeAspect="1"/>
+          </p:cNvPicPr>
+          <p:nvPr/>
+        </p:nvPicPr>
+        <p:blipFill rotWithShape="1">
+          <a:blip r:embed="rId2">
+            <a:alphaModFix/>
+          </a:blip>
+          <a:srcRect l="9640" t="12864" r="9640" b="26565"/>
+          <a:stretch/>
+        </p:blipFill>
+        <p:spPr>
+          <a:xfrm>
+            <a:off x="0" y="0"/>
+            <a:ext cx="12192000" cy="6858001"/>
+          </a:xfrm>
+          <a:prstGeom prst="rect">
+            <a:avLst/>
+          </a:prstGeom>
+        </p:spPr>
+      </p:pic>
+    </p:spTree>
+    <p:extLst>
+      <p:ext uri="{BB962C8B-B14F-4D97-AF65-F5344CB8AC3E}">
+        <p14:creationId xmlns:p14="http://schemas.microsoft.com/office/powerpoint/2010/main" val="1055953545"/>
+      </p:ext>
+    </p:extLst>
+  </p:cSld>
+  <p:clrMapOvr>
+    <a:masterClrMapping/>
+  </p:clrMapOvr>
+</p:sld>
+</file>
+
+<file path=ppt/slides/slide9.xml><?xml version="1.0" encoding="utf-8"?>
+<p:sld xmlns:a="http://schemas.openxmlformats.org/drawingml/2006/main" xmlns:r="http://schemas.openxmlformats.org/officeDocument/2006/relationships" xmlns:p="http://schemas.openxmlformats.org/presentationml/2006/main">
+  <p:cSld>
+    <p:spTree>
+      <p:nvGrpSpPr>
+        <p:cNvPr id="1" name=""/>
+        <p:cNvGrpSpPr/>
+        <p:nvPr/>
+      </p:nvGrpSpPr>
+      <p:grpSpPr>
+        <a:xfrm>
+          <a:off x="0" y="0"/>
+          <a:ext cx="0" cy="0"/>
+          <a:chOff x="0" y="0"/>
+          <a:chExt cx="0" cy="0"/>
+        </a:xfrm>
+      </p:grpSpPr>
+      <p:sp>
+        <p:nvSpPr>
+          <p:cNvPr id="2" name="Title 1">
+            <a:extLst>
+              <a:ext uri="{FF2B5EF4-FFF2-40B4-BE49-F238E27FC236}">
+                <a16:creationId xmlns:a16="http://schemas.microsoft.com/office/drawing/2014/main" id="{A5513573-74B4-E74C-9FE0-8DCFAC8FD963}"/>
+              </a:ext>
+            </a:extLst>
+          </p:cNvPr>
+          <p:cNvSpPr>
+            <a:spLocks noGrp="1"/>
+          </p:cNvSpPr>
+          <p:nvPr>
+            <p:ph type="title"/>
+          </p:nvPr>
+        </p:nvSpPr>
+        <p:spPr/>
+        <p:txBody>
+          <a:bodyPr/>
+          <a:lstStyle/>
+          <a:p>
+            <a:r>
+              <a:rPr lang="en-US" dirty="0"/>
+              <a:t>Babel</a:t>
+            </a:r>
+          </a:p>
+        </p:txBody>
+      </p:sp>
+      <p:sp>
+        <p:nvSpPr>
+          <p:cNvPr id="3" name="Text Placeholder 2">
+            <a:extLst>
+              <a:ext uri="{FF2B5EF4-FFF2-40B4-BE49-F238E27FC236}">
+                <a16:creationId xmlns:a16="http://schemas.microsoft.com/office/drawing/2014/main" id="{4578B4E2-8677-1542-901F-E9C71A7D79D4}"/>
+              </a:ext>
+            </a:extLst>
+          </p:cNvPr>
+          <p:cNvSpPr>
+            <a:spLocks noGrp="1"/>
+          </p:cNvSpPr>
+          <p:nvPr>
+            <p:ph type="body" idx="1"/>
+          </p:nvPr>
+        </p:nvSpPr>
+        <p:spPr/>
+        <p:txBody>
+          <a:bodyPr/>
+          <a:lstStyle/>
+          <a:p>
+            <a:r>
+              <a:rPr lang="en-US" dirty="0"/>
+              <a:t>Transform something into usable JavaScript (aka compiler)</a:t>
+            </a:r>
+          </a:p>
+        </p:txBody>
+      </p:sp>
+    </p:spTree>
+    <p:extLst>
+      <p:ext uri="{BB962C8B-B14F-4D97-AF65-F5344CB8AC3E}">
+        <p14:creationId xmlns:p14="http://schemas.microsoft.com/office/powerpoint/2010/main" val="2912793240"/>
+      </p:ext>
+    </p:extLst>
+  </p:cSld>
+  <p:clrMapOvr>
+    <a:masterClrMapping/>
+  </p:clrMapOvr>
+</p:sld>
+</file>
+
 <file path=ppt/theme/theme1.xml><?xml version="1.0" encoding="utf-8"?>
 <a:theme xmlns:a="http://schemas.openxmlformats.org/drawingml/2006/main" name="Office Theme">
   <a:themeElements>

</xml_diff>